<commit_message>
ps2; typos: propositions, logic_formulas
</commit_message>
<xml_diff>
--- a/spring11/slides11/slides2f.pptx
+++ b/spring11/slides11/slides2f.pptx
@@ -17612,7 +17612,7 @@
 </file>
 
 <file path=ppt/slides/slide28.xml><?xml version="1.0" encoding="utf-8"?>
-<p:sld xmlns:a="http://schemas.openxmlformats.org/drawingml/2006/main" xmlns:r="http://schemas.openxmlformats.org/officeDocument/2006/relationships" xmlns:mc="http://schemas.openxmlformats.org/markup-compatibility/2006" xmlns:mv="urn:schemas-microsoft-com:mac:vml" xmlns:p="http://schemas.openxmlformats.org/presentationml/2006/main" mc:Ignorable="mv" mc:PreserveAttributes="mv:*" show="0">
+<p:sld xmlns:a="http://schemas.openxmlformats.org/drawingml/2006/main" xmlns:r="http://schemas.openxmlformats.org/officeDocument/2006/relationships" xmlns:mc="http://schemas.openxmlformats.org/markup-compatibility/2006" xmlns:mv="urn:schemas-microsoft-com:mac:vml" xmlns:p="http://schemas.openxmlformats.org/presentationml/2006/main" mc:Ignorable="mv" mc:PreserveAttributes="mv:*">
   <p:cSld>
     <p:spTree>
       <p:nvGrpSpPr>
@@ -21367,13 +21367,13 @@
               <a:buNone/>
             </a:pPr>
             <a:r>
-              <a:rPr lang="en-US" sz="11500" smtClean="0">
+              <a:rPr lang="en-US" sz="11500" dirty="0" smtClean="0">
                 <a:sym typeface="Euclid Symbol"/>
               </a:rPr>
               <a:t>1</a:t>
             </a:r>
             <a:r>
-              <a:rPr lang="en-US" sz="11500" smtClean="0">
+              <a:rPr lang="en-US" sz="11500" dirty="0" smtClean="0">
                 <a:sym typeface="Euclid Symbol"/>
               </a:rPr>
               <a:t>--4</a:t>

</xml_diff>